<commit_message>
added solution for selenium grid
</commit_message>
<xml_diff>
--- a/SimpleProactiveBot/ProactiveBot.pptx
+++ b/SimpleProactiveBot/ProactiveBot.pptx
@@ -6,10 +6,14 @@
   </p:sldMasterIdLst>
   <p:sldIdLst>
     <p:sldId id="259" r:id="rId2"/>
-    <p:sldId id="257" r:id="rId3"/>
-    <p:sldId id="260" r:id="rId4"/>
-    <p:sldId id="261" r:id="rId5"/>
-    <p:sldId id="258" r:id="rId6"/>
+    <p:sldId id="262" r:id="rId3"/>
+    <p:sldId id="265" r:id="rId4"/>
+    <p:sldId id="260" r:id="rId5"/>
+    <p:sldId id="257" r:id="rId6"/>
+    <p:sldId id="261" r:id="rId7"/>
+    <p:sldId id="264" r:id="rId8"/>
+    <p:sldId id="258" r:id="rId9"/>
+    <p:sldId id="266" r:id="rId10"/>
   </p:sldIdLst>
   <p:sldSz cx="12192000" cy="6858000"/>
   <p:notesSz cx="6858000" cy="9144000"/>
@@ -108,6 +112,11 @@
       </a:defRPr>
     </a:lvl9pPr>
   </p:defaultTextStyle>
+  <p:extLst>
+    <p:ext uri="{EFAFB233-063F-42B5-8137-9DF3F51BA10A}">
+      <p15:sldGuideLst xmlns:p15="http://schemas.microsoft.com/office/powerpoint/2012/main"/>
+    </p:ext>
+  </p:extLst>
 </p:presentation>
 </file>
 
@@ -4205,7 +4214,7 @@
           <a:p>
             <a:fld id="{27B50CA0-92FB-4348-8B25-DD89FB22F70B}" type="datetimeFigureOut">
               <a:rPr lang="en-US" smtClean="0"/>
-              <a:t>3/11/2018</a:t>
+              <a:t>3/15/2018</a:t>
             </a:fld>
             <a:endParaRPr lang="en-US"/>
           </a:p>
@@ -4403,7 +4412,7 @@
           <a:p>
             <a:fld id="{27B50CA0-92FB-4348-8B25-DD89FB22F70B}" type="datetimeFigureOut">
               <a:rPr lang="en-US" smtClean="0"/>
-              <a:t>3/11/2018</a:t>
+              <a:t>3/15/2018</a:t>
             </a:fld>
             <a:endParaRPr lang="en-US"/>
           </a:p>
@@ -4611,7 +4620,7 @@
           <a:p>
             <a:fld id="{27B50CA0-92FB-4348-8B25-DD89FB22F70B}" type="datetimeFigureOut">
               <a:rPr lang="en-US" smtClean="0"/>
-              <a:t>3/11/2018</a:t>
+              <a:t>3/15/2018</a:t>
             </a:fld>
             <a:endParaRPr lang="en-US"/>
           </a:p>
@@ -4809,7 +4818,7 @@
           <a:p>
             <a:fld id="{27B50CA0-92FB-4348-8B25-DD89FB22F70B}" type="datetimeFigureOut">
               <a:rPr lang="en-US" smtClean="0"/>
-              <a:t>3/11/2018</a:t>
+              <a:t>3/15/2018</a:t>
             </a:fld>
             <a:endParaRPr lang="en-US"/>
           </a:p>
@@ -5084,7 +5093,7 @@
           <a:p>
             <a:fld id="{27B50CA0-92FB-4348-8B25-DD89FB22F70B}" type="datetimeFigureOut">
               <a:rPr lang="en-US" smtClean="0"/>
-              <a:t>3/11/2018</a:t>
+              <a:t>3/15/2018</a:t>
             </a:fld>
             <a:endParaRPr lang="en-US"/>
           </a:p>
@@ -5349,7 +5358,7 @@
           <a:p>
             <a:fld id="{27B50CA0-92FB-4348-8B25-DD89FB22F70B}" type="datetimeFigureOut">
               <a:rPr lang="en-US" smtClean="0"/>
-              <a:t>3/11/2018</a:t>
+              <a:t>3/15/2018</a:t>
             </a:fld>
             <a:endParaRPr lang="en-US"/>
           </a:p>
@@ -5761,7 +5770,7 @@
           <a:p>
             <a:fld id="{27B50CA0-92FB-4348-8B25-DD89FB22F70B}" type="datetimeFigureOut">
               <a:rPr lang="en-US" smtClean="0"/>
-              <a:t>3/11/2018</a:t>
+              <a:t>3/15/2018</a:t>
             </a:fld>
             <a:endParaRPr lang="en-US"/>
           </a:p>
@@ -5902,7 +5911,7 @@
           <a:p>
             <a:fld id="{27B50CA0-92FB-4348-8B25-DD89FB22F70B}" type="datetimeFigureOut">
               <a:rPr lang="en-US" smtClean="0"/>
-              <a:t>3/11/2018</a:t>
+              <a:t>3/15/2018</a:t>
             </a:fld>
             <a:endParaRPr lang="en-US"/>
           </a:p>
@@ -6015,7 +6024,7 @@
           <a:p>
             <a:fld id="{27B50CA0-92FB-4348-8B25-DD89FB22F70B}" type="datetimeFigureOut">
               <a:rPr lang="en-US" smtClean="0"/>
-              <a:t>3/11/2018</a:t>
+              <a:t>3/15/2018</a:t>
             </a:fld>
             <a:endParaRPr lang="en-US"/>
           </a:p>
@@ -6326,7 +6335,7 @@
           <a:p>
             <a:fld id="{27B50CA0-92FB-4348-8B25-DD89FB22F70B}" type="datetimeFigureOut">
               <a:rPr lang="en-US" smtClean="0"/>
-              <a:t>3/11/2018</a:t>
+              <a:t>3/15/2018</a:t>
             </a:fld>
             <a:endParaRPr lang="en-US"/>
           </a:p>
@@ -6614,7 +6623,7 @@
           <a:p>
             <a:fld id="{27B50CA0-92FB-4348-8B25-DD89FB22F70B}" type="datetimeFigureOut">
               <a:rPr lang="en-US" smtClean="0"/>
-              <a:t>3/11/2018</a:t>
+              <a:t>3/15/2018</a:t>
             </a:fld>
             <a:endParaRPr lang="en-US"/>
           </a:p>
@@ -6855,7 +6864,7 @@
           <a:p>
             <a:fld id="{27B50CA0-92FB-4348-8B25-DD89FB22F70B}" type="datetimeFigureOut">
               <a:rPr lang="en-US" smtClean="0"/>
-              <a:t>3/11/2018</a:t>
+              <a:t>3/15/2018</a:t>
             </a:fld>
             <a:endParaRPr lang="en-US"/>
           </a:p>
@@ -7792,6 +7801,92 @@
           </a:p>
         </p:txBody>
       </p:sp>
+      <p:pic>
+        <p:nvPicPr>
+          <p:cNvPr id="1026" name="Picture 2" descr="Image result for linked.in">
+            <a:extLst>
+              <a:ext uri="{FF2B5EF4-FFF2-40B4-BE49-F238E27FC236}">
+                <a16:creationId xmlns:a16="http://schemas.microsoft.com/office/drawing/2014/main" id="{62A9A3F5-573D-4082-A44F-79587DE91578}"/>
+              </a:ext>
+            </a:extLst>
+          </p:cNvPr>
+          <p:cNvPicPr>
+            <a:picLocks noChangeAspect="1" noChangeArrowheads="1"/>
+          </p:cNvPicPr>
+          <p:nvPr/>
+        </p:nvPicPr>
+        <p:blipFill>
+          <a:blip r:embed="rId4">
+            <a:extLst>
+              <a:ext uri="{28A0092B-C50C-407E-A947-70E740481C1C}">
+                <a14:useLocalDpi xmlns:a14="http://schemas.microsoft.com/office/drawing/2010/main" val="0"/>
+              </a:ext>
+            </a:extLst>
+          </a:blip>
+          <a:srcRect/>
+          <a:stretch>
+            <a:fillRect/>
+          </a:stretch>
+        </p:blipFill>
+        <p:spPr bwMode="auto">
+          <a:xfrm>
+            <a:off x="8394627" y="158261"/>
+            <a:ext cx="509257" cy="509257"/>
+          </a:xfrm>
+          <a:prstGeom prst="rect">
+            <a:avLst/>
+          </a:prstGeom>
+          <a:noFill/>
+          <a:extLst>
+            <a:ext uri="{909E8E84-426E-40DD-AFC4-6F175D3DCCD1}">
+              <a14:hiddenFill xmlns:a14="http://schemas.microsoft.com/office/drawing/2010/main">
+                <a:solidFill>
+                  <a:srgbClr val="FFFFFF"/>
+                </a:solidFill>
+              </a14:hiddenFill>
+            </a:ext>
+          </a:extLst>
+        </p:spPr>
+      </p:pic>
+      <p:sp>
+        <p:nvSpPr>
+          <p:cNvPr id="4" name="TextBox 3">
+            <a:extLst>
+              <a:ext uri="{FF2B5EF4-FFF2-40B4-BE49-F238E27FC236}">
+                <a16:creationId xmlns:a16="http://schemas.microsoft.com/office/drawing/2014/main" id="{CE570B18-5653-4E2E-9306-30B61E98E785}"/>
+              </a:ext>
+            </a:extLst>
+          </p:cNvPr>
+          <p:cNvSpPr txBox="1"/>
+          <p:nvPr/>
+        </p:nvSpPr>
+        <p:spPr>
+          <a:xfrm>
+            <a:off x="8953042" y="342927"/>
+            <a:ext cx="3004497" cy="369332"/>
+          </a:xfrm>
+          <a:prstGeom prst="rect">
+            <a:avLst/>
+          </a:prstGeom>
+          <a:noFill/>
+        </p:spPr>
+        <p:txBody>
+          <a:bodyPr wrap="square" rtlCol="0">
+            <a:spAutoFit/>
+          </a:bodyPr>
+          <a:lstStyle/>
+          <a:p>
+            <a:r>
+              <a:rPr lang="en-US" dirty="0">
+                <a:solidFill>
+                  <a:schemeClr val="bg1"/>
+                </a:solidFill>
+              </a:rPr>
+              <a:t>www.linkedin.com/in/vishsrik</a:t>
+            </a:r>
+          </a:p>
+        </p:txBody>
+      </p:sp>
     </p:spTree>
     <p:extLst>
       <p:ext uri="{BB962C8B-B14F-4D97-AF65-F5344CB8AC3E}">
@@ -7802,6 +7897,14 @@
   <p:clrMapOvr>
     <a:masterClrMapping/>
   </p:clrMapOvr>
+  <mc:AlternateContent xmlns:mc="http://schemas.openxmlformats.org/markup-compatibility/2006" xmlns:p14="http://schemas.microsoft.com/office/powerpoint/2010/main">
+    <mc:Choice Requires="p14">
+      <p:transition spd="slow" p14:dur="2000" advTm="10545"/>
+    </mc:Choice>
+    <mc:Fallback xmlns="">
+      <p:transition spd="slow" advTm="10545"/>
+    </mc:Fallback>
+  </mc:AlternateContent>
 </p:sld>
 </file>
 
@@ -7811,7 +7914,7 @@
     <p:bg>
       <p:bgPr>
         <a:solidFill>
-          <a:schemeClr val="accent6"/>
+          <a:srgbClr val="002060"/>
         </a:solidFill>
         <a:effectLst/>
       </p:bgPr>
@@ -7835,6 +7938,1314 @@
           <p:cNvPr id="2" name="Title 1">
             <a:extLst>
               <a:ext uri="{FF2B5EF4-FFF2-40B4-BE49-F238E27FC236}">
+                <a16:creationId xmlns:a16="http://schemas.microsoft.com/office/drawing/2014/main" id="{87DF79DA-3F24-411D-BF85-0660985F48DB}"/>
+              </a:ext>
+            </a:extLst>
+          </p:cNvPr>
+          <p:cNvSpPr>
+            <a:spLocks noGrp="1"/>
+          </p:cNvSpPr>
+          <p:nvPr>
+            <p:ph type="title"/>
+          </p:nvPr>
+        </p:nvSpPr>
+        <p:spPr/>
+        <p:txBody>
+          <a:bodyPr/>
+          <a:lstStyle/>
+          <a:p>
+            <a:r>
+              <a:rPr lang="en-US" dirty="0">
+                <a:solidFill>
+                  <a:schemeClr val="bg1"/>
+                </a:solidFill>
+                <a:latin typeface="Segoe UI Light" panose="020B0502040204020203" pitchFamily="34" charset="0"/>
+                <a:cs typeface="Segoe UI Light" panose="020B0502040204020203" pitchFamily="34" charset="0"/>
+              </a:rPr>
+              <a:t>Prerequisites</a:t>
+            </a:r>
+          </a:p>
+        </p:txBody>
+      </p:sp>
+      <p:sp>
+        <p:nvSpPr>
+          <p:cNvPr id="3" name="Content Placeholder 2">
+            <a:extLst>
+              <a:ext uri="{FF2B5EF4-FFF2-40B4-BE49-F238E27FC236}">
+                <a16:creationId xmlns:a16="http://schemas.microsoft.com/office/drawing/2014/main" id="{E91C997D-02CC-4CB8-B625-07E299E40464}"/>
+              </a:ext>
+            </a:extLst>
+          </p:cNvPr>
+          <p:cNvSpPr>
+            <a:spLocks noGrp="1"/>
+          </p:cNvSpPr>
+          <p:nvPr>
+            <p:ph idx="1"/>
+          </p:nvPr>
+        </p:nvSpPr>
+        <p:spPr/>
+        <p:txBody>
+          <a:bodyPr/>
+          <a:lstStyle/>
+          <a:p>
+            <a:r>
+              <a:rPr lang="en-US" dirty="0">
+                <a:solidFill>
+                  <a:schemeClr val="bg1"/>
+                </a:solidFill>
+                <a:latin typeface="Segoe UI Light" panose="020B0502040204020203" pitchFamily="34" charset="0"/>
+                <a:cs typeface="Segoe UI Light" panose="020B0502040204020203" pitchFamily="34" charset="0"/>
+              </a:rPr>
+              <a:t>Visual Studio 2017 (</a:t>
+            </a:r>
+            <a:r>
+              <a:rPr lang="en-US" dirty="0">
+                <a:solidFill>
+                  <a:schemeClr val="bg1"/>
+                </a:solidFill>
+                <a:latin typeface="Segoe UI Light" panose="020B0502040204020203" pitchFamily="34" charset="0"/>
+                <a:cs typeface="Segoe UI Light" panose="020B0502040204020203" pitchFamily="34" charset="0"/>
+                <a:hlinkClick r:id="rId2"/>
+              </a:rPr>
+              <a:t>Free Edition</a:t>
+            </a:r>
+            <a:r>
+              <a:rPr lang="en-US" dirty="0">
+                <a:solidFill>
+                  <a:schemeClr val="bg1"/>
+                </a:solidFill>
+                <a:latin typeface="Segoe UI Light" panose="020B0502040204020203" pitchFamily="34" charset="0"/>
+                <a:cs typeface="Segoe UI Light" panose="020B0502040204020203" pitchFamily="34" charset="0"/>
+              </a:rPr>
+              <a:t>)</a:t>
+            </a:r>
+          </a:p>
+          <a:p>
+            <a:r>
+              <a:rPr lang="en-US" dirty="0">
+                <a:solidFill>
+                  <a:schemeClr val="bg1"/>
+                </a:solidFill>
+                <a:latin typeface="Segoe UI Light" panose="020B0502040204020203" pitchFamily="34" charset="0"/>
+                <a:cs typeface="Segoe UI Light" panose="020B0502040204020203" pitchFamily="34" charset="0"/>
+              </a:rPr>
+              <a:t>Microsoft Azure Subscription (</a:t>
+            </a:r>
+            <a:r>
+              <a:rPr lang="en-US" dirty="0">
+                <a:solidFill>
+                  <a:schemeClr val="bg1"/>
+                </a:solidFill>
+                <a:latin typeface="Segoe UI Light" panose="020B0502040204020203" pitchFamily="34" charset="0"/>
+                <a:cs typeface="Segoe UI Light" panose="020B0502040204020203" pitchFamily="34" charset="0"/>
+                <a:hlinkClick r:id="rId3"/>
+              </a:rPr>
+              <a:t>Free Trial</a:t>
+            </a:r>
+            <a:r>
+              <a:rPr lang="en-US" dirty="0">
+                <a:solidFill>
+                  <a:schemeClr val="bg1"/>
+                </a:solidFill>
+                <a:latin typeface="Segoe UI Light" panose="020B0502040204020203" pitchFamily="34" charset="0"/>
+                <a:cs typeface="Segoe UI Light" panose="020B0502040204020203" pitchFamily="34" charset="0"/>
+              </a:rPr>
+              <a:t>)</a:t>
+            </a:r>
+          </a:p>
+          <a:p>
+            <a:r>
+              <a:rPr lang="en-US" dirty="0">
+                <a:solidFill>
+                  <a:schemeClr val="bg1"/>
+                </a:solidFill>
+                <a:latin typeface="Segoe UI Light" panose="020B0502040204020203" pitchFamily="34" charset="0"/>
+                <a:cs typeface="Segoe UI Light" panose="020B0502040204020203" pitchFamily="34" charset="0"/>
+              </a:rPr>
+              <a:t>Fundamentals of Building Bot (</a:t>
+            </a:r>
+            <a:r>
+              <a:rPr lang="en-US" dirty="0">
+                <a:solidFill>
+                  <a:schemeClr val="bg1"/>
+                </a:solidFill>
+                <a:latin typeface="Segoe UI Light" panose="020B0502040204020203" pitchFamily="34" charset="0"/>
+                <a:cs typeface="Segoe UI Light" panose="020B0502040204020203" pitchFamily="34" charset="0"/>
+                <a:hlinkClick r:id="rId4"/>
+              </a:rPr>
+              <a:t>Documentation</a:t>
+            </a:r>
+            <a:r>
+              <a:rPr lang="en-US" dirty="0">
+                <a:solidFill>
+                  <a:schemeClr val="bg1"/>
+                </a:solidFill>
+                <a:latin typeface="Segoe UI Light" panose="020B0502040204020203" pitchFamily="34" charset="0"/>
+                <a:cs typeface="Segoe UI Light" panose="020B0502040204020203" pitchFamily="34" charset="0"/>
+              </a:rPr>
+              <a:t>)</a:t>
+            </a:r>
+          </a:p>
+        </p:txBody>
+      </p:sp>
+    </p:spTree>
+    <p:extLst>
+      <p:ext uri="{BB962C8B-B14F-4D97-AF65-F5344CB8AC3E}">
+        <p14:creationId xmlns:p14="http://schemas.microsoft.com/office/powerpoint/2010/main" val="1115050708"/>
+      </p:ext>
+    </p:extLst>
+  </p:cSld>
+  <p:clrMapOvr>
+    <a:masterClrMapping/>
+  </p:clrMapOvr>
+</p:sld>
+</file>
+
+<file path=ppt/slides/slide3.xml><?xml version="1.0" encoding="utf-8"?>
+<p:sld xmlns:a="http://schemas.openxmlformats.org/drawingml/2006/main" xmlns:r="http://schemas.openxmlformats.org/officeDocument/2006/relationships" xmlns:p="http://schemas.openxmlformats.org/presentationml/2006/main">
+  <p:cSld>
+    <p:bg>
+      <p:bgPr>
+        <a:solidFill>
+          <a:srgbClr val="002060"/>
+        </a:solidFill>
+        <a:effectLst/>
+      </p:bgPr>
+    </p:bg>
+    <p:spTree>
+      <p:nvGrpSpPr>
+        <p:cNvPr id="1" name=""/>
+        <p:cNvGrpSpPr/>
+        <p:nvPr/>
+      </p:nvGrpSpPr>
+      <p:grpSpPr>
+        <a:xfrm>
+          <a:off x="0" y="0"/>
+          <a:ext cx="0" cy="0"/>
+          <a:chOff x="0" y="0"/>
+          <a:chExt cx="0" cy="0"/>
+        </a:xfrm>
+      </p:grpSpPr>
+      <p:sp>
+        <p:nvSpPr>
+          <p:cNvPr id="2" name="Title 1">
+            <a:extLst>
+              <a:ext uri="{FF2B5EF4-FFF2-40B4-BE49-F238E27FC236}">
+                <a16:creationId xmlns:a16="http://schemas.microsoft.com/office/drawing/2014/main" id="{D075B891-B6DE-42BD-8BE1-AB738E09122D}"/>
+              </a:ext>
+            </a:extLst>
+          </p:cNvPr>
+          <p:cNvSpPr>
+            <a:spLocks noGrp="1"/>
+          </p:cNvSpPr>
+          <p:nvPr>
+            <p:ph type="title"/>
+          </p:nvPr>
+        </p:nvSpPr>
+        <p:spPr>
+          <a:xfrm>
+            <a:off x="742950" y="0"/>
+            <a:ext cx="10515600" cy="1325563"/>
+          </a:xfrm>
+        </p:spPr>
+        <p:txBody>
+          <a:bodyPr/>
+          <a:lstStyle/>
+          <a:p>
+            <a:r>
+              <a:rPr lang="en-US" dirty="0">
+                <a:solidFill>
+                  <a:schemeClr val="bg1"/>
+                </a:solidFill>
+                <a:latin typeface="Segoe UI Light" panose="020B0502040204020203" pitchFamily="34" charset="0"/>
+                <a:cs typeface="Segoe UI Light" panose="020B0502040204020203" pitchFamily="34" charset="0"/>
+              </a:rPr>
+              <a:t>Proactive Bot</a:t>
+            </a:r>
+          </a:p>
+        </p:txBody>
+      </p:sp>
+      <p:sp>
+        <p:nvSpPr>
+          <p:cNvPr id="5" name="Oval 4">
+            <a:extLst>
+              <a:ext uri="{FF2B5EF4-FFF2-40B4-BE49-F238E27FC236}">
+                <a16:creationId xmlns:a16="http://schemas.microsoft.com/office/drawing/2014/main" id="{6BF0704C-3C18-4819-AC44-6283F24C7000}"/>
+              </a:ext>
+            </a:extLst>
+          </p:cNvPr>
+          <p:cNvSpPr/>
+          <p:nvPr/>
+        </p:nvSpPr>
+        <p:spPr>
+          <a:xfrm>
+            <a:off x="2390775" y="2846387"/>
+            <a:ext cx="1314450" cy="1325563"/>
+          </a:xfrm>
+          <a:prstGeom prst="ellipse">
+            <a:avLst/>
+          </a:prstGeom>
+          <a:solidFill>
+            <a:srgbClr val="002060"/>
+          </a:solidFill>
+          <a:ln w="38100">
+            <a:solidFill>
+              <a:schemeClr val="bg1"/>
+            </a:solidFill>
+          </a:ln>
+        </p:spPr>
+        <p:style>
+          <a:lnRef idx="2">
+            <a:schemeClr val="accent1">
+              <a:shade val="50000"/>
+            </a:schemeClr>
+          </a:lnRef>
+          <a:fillRef idx="1">
+            <a:schemeClr val="accent1"/>
+          </a:fillRef>
+          <a:effectRef idx="0">
+            <a:schemeClr val="accent1"/>
+          </a:effectRef>
+          <a:fontRef idx="minor">
+            <a:schemeClr val="lt1"/>
+          </a:fontRef>
+        </p:style>
+        <p:txBody>
+          <a:bodyPr rtlCol="0" anchor="ctr"/>
+          <a:lstStyle/>
+          <a:p>
+            <a:pPr algn="ctr"/>
+            <a:r>
+              <a:rPr lang="en-US" dirty="0"/>
+              <a:t>User</a:t>
+            </a:r>
+          </a:p>
+        </p:txBody>
+      </p:sp>
+      <p:sp>
+        <p:nvSpPr>
+          <p:cNvPr id="6" name="Oval 5">
+            <a:extLst>
+              <a:ext uri="{FF2B5EF4-FFF2-40B4-BE49-F238E27FC236}">
+                <a16:creationId xmlns:a16="http://schemas.microsoft.com/office/drawing/2014/main" id="{3752E421-98C5-4F45-BB2A-1447574CFD91}"/>
+              </a:ext>
+            </a:extLst>
+          </p:cNvPr>
+          <p:cNvSpPr/>
+          <p:nvPr/>
+        </p:nvSpPr>
+        <p:spPr>
+          <a:xfrm>
+            <a:off x="6143625" y="2846387"/>
+            <a:ext cx="1314450" cy="1325563"/>
+          </a:xfrm>
+          <a:prstGeom prst="ellipse">
+            <a:avLst/>
+          </a:prstGeom>
+          <a:solidFill>
+            <a:srgbClr val="002060"/>
+          </a:solidFill>
+          <a:ln w="38100">
+            <a:solidFill>
+              <a:schemeClr val="bg1"/>
+            </a:solidFill>
+          </a:ln>
+        </p:spPr>
+        <p:style>
+          <a:lnRef idx="2">
+            <a:schemeClr val="accent1">
+              <a:shade val="50000"/>
+            </a:schemeClr>
+          </a:lnRef>
+          <a:fillRef idx="1">
+            <a:schemeClr val="accent1"/>
+          </a:fillRef>
+          <a:effectRef idx="0">
+            <a:schemeClr val="accent1"/>
+          </a:effectRef>
+          <a:fontRef idx="minor">
+            <a:schemeClr val="lt1"/>
+          </a:fontRef>
+        </p:style>
+        <p:txBody>
+          <a:bodyPr rtlCol="0" anchor="ctr"/>
+          <a:lstStyle/>
+          <a:p>
+            <a:pPr algn="ctr"/>
+            <a:r>
+              <a:rPr lang="en-US" dirty="0"/>
+              <a:t>Bot</a:t>
+            </a:r>
+          </a:p>
+        </p:txBody>
+      </p:sp>
+      <p:cxnSp>
+        <p:nvCxnSpPr>
+          <p:cNvPr id="8" name="Straight Arrow Connector 7">
+            <a:extLst>
+              <a:ext uri="{FF2B5EF4-FFF2-40B4-BE49-F238E27FC236}">
+                <a16:creationId xmlns:a16="http://schemas.microsoft.com/office/drawing/2014/main" id="{34EF75F5-5EB6-4455-BA4E-1F7D57CC2D3C}"/>
+              </a:ext>
+            </a:extLst>
+          </p:cNvPr>
+          <p:cNvCxnSpPr>
+            <a:cxnSpLocks/>
+          </p:cNvCxnSpPr>
+          <p:nvPr/>
+        </p:nvCxnSpPr>
+        <p:spPr>
+          <a:xfrm>
+            <a:off x="3705225" y="3223419"/>
+            <a:ext cx="2438400" cy="0"/>
+          </a:xfrm>
+          <a:prstGeom prst="straightConnector1">
+            <a:avLst/>
+          </a:prstGeom>
+          <a:ln w="44450">
+            <a:solidFill>
+              <a:schemeClr val="bg1"/>
+            </a:solidFill>
+            <a:tailEnd type="triangle"/>
+          </a:ln>
+        </p:spPr>
+        <p:style>
+          <a:lnRef idx="1">
+            <a:schemeClr val="accent1"/>
+          </a:lnRef>
+          <a:fillRef idx="0">
+            <a:schemeClr val="accent1"/>
+          </a:fillRef>
+          <a:effectRef idx="0">
+            <a:schemeClr val="accent1"/>
+          </a:effectRef>
+          <a:fontRef idx="minor">
+            <a:schemeClr val="tx1"/>
+          </a:fontRef>
+        </p:style>
+      </p:cxnSp>
+      <p:cxnSp>
+        <p:nvCxnSpPr>
+          <p:cNvPr id="9" name="Straight Arrow Connector 8">
+            <a:extLst>
+              <a:ext uri="{FF2B5EF4-FFF2-40B4-BE49-F238E27FC236}">
+                <a16:creationId xmlns:a16="http://schemas.microsoft.com/office/drawing/2014/main" id="{CA0DEEE4-1925-44AE-90FB-4903F7091D6F}"/>
+              </a:ext>
+            </a:extLst>
+          </p:cNvPr>
+          <p:cNvCxnSpPr>
+            <a:cxnSpLocks/>
+          </p:cNvCxnSpPr>
+          <p:nvPr/>
+        </p:nvCxnSpPr>
+        <p:spPr>
+          <a:xfrm flipH="1">
+            <a:off x="3705225" y="3619500"/>
+            <a:ext cx="2371725" cy="0"/>
+          </a:xfrm>
+          <a:prstGeom prst="straightConnector1">
+            <a:avLst/>
+          </a:prstGeom>
+          <a:ln w="44450">
+            <a:solidFill>
+              <a:schemeClr val="bg1"/>
+            </a:solidFill>
+            <a:tailEnd type="triangle"/>
+          </a:ln>
+        </p:spPr>
+        <p:style>
+          <a:lnRef idx="1">
+            <a:schemeClr val="accent1"/>
+          </a:lnRef>
+          <a:fillRef idx="0">
+            <a:schemeClr val="accent1"/>
+          </a:fillRef>
+          <a:effectRef idx="0">
+            <a:schemeClr val="accent1"/>
+          </a:effectRef>
+          <a:fontRef idx="minor">
+            <a:schemeClr val="tx1"/>
+          </a:fontRef>
+        </p:style>
+      </p:cxnSp>
+      <p:sp>
+        <p:nvSpPr>
+          <p:cNvPr id="12" name="TextBox 11">
+            <a:extLst>
+              <a:ext uri="{FF2B5EF4-FFF2-40B4-BE49-F238E27FC236}">
+                <a16:creationId xmlns:a16="http://schemas.microsoft.com/office/drawing/2014/main" id="{ACB193FB-7725-4199-90B2-D05153DB0E2F}"/>
+              </a:ext>
+            </a:extLst>
+          </p:cNvPr>
+          <p:cNvSpPr txBox="1"/>
+          <p:nvPr/>
+        </p:nvSpPr>
+        <p:spPr>
+          <a:xfrm>
+            <a:off x="4338637" y="2523221"/>
+            <a:ext cx="1519238" cy="646331"/>
+          </a:xfrm>
+          <a:prstGeom prst="rect">
+            <a:avLst/>
+          </a:prstGeom>
+          <a:noFill/>
+        </p:spPr>
+        <p:txBody>
+          <a:bodyPr wrap="square" rtlCol="0">
+            <a:spAutoFit/>
+          </a:bodyPr>
+          <a:lstStyle/>
+          <a:p>
+            <a:r>
+              <a:rPr lang="en-US" dirty="0">
+                <a:solidFill>
+                  <a:schemeClr val="bg1"/>
+                </a:solidFill>
+              </a:rPr>
+              <a:t>Initiates Conversation</a:t>
+            </a:r>
+          </a:p>
+        </p:txBody>
+      </p:sp>
+      <p:sp>
+        <p:nvSpPr>
+          <p:cNvPr id="13" name="TextBox 12">
+            <a:extLst>
+              <a:ext uri="{FF2B5EF4-FFF2-40B4-BE49-F238E27FC236}">
+                <a16:creationId xmlns:a16="http://schemas.microsoft.com/office/drawing/2014/main" id="{B40135FF-21A0-4C17-BAC8-5112BB807CDB}"/>
+              </a:ext>
+            </a:extLst>
+          </p:cNvPr>
+          <p:cNvSpPr txBox="1"/>
+          <p:nvPr/>
+        </p:nvSpPr>
+        <p:spPr>
+          <a:xfrm>
+            <a:off x="4164806" y="3265249"/>
+            <a:ext cx="1519238" cy="369332"/>
+          </a:xfrm>
+          <a:prstGeom prst="rect">
+            <a:avLst/>
+          </a:prstGeom>
+          <a:noFill/>
+        </p:spPr>
+        <p:txBody>
+          <a:bodyPr wrap="square" rtlCol="0">
+            <a:spAutoFit/>
+          </a:bodyPr>
+          <a:lstStyle/>
+          <a:p>
+            <a:r>
+              <a:rPr lang="en-US" dirty="0">
+                <a:solidFill>
+                  <a:schemeClr val="bg1"/>
+                </a:solidFill>
+              </a:rPr>
+              <a:t>Bot Responds</a:t>
+            </a:r>
+          </a:p>
+        </p:txBody>
+      </p:sp>
+      <p:cxnSp>
+        <p:nvCxnSpPr>
+          <p:cNvPr id="14" name="Straight Arrow Connector 13">
+            <a:extLst>
+              <a:ext uri="{FF2B5EF4-FFF2-40B4-BE49-F238E27FC236}">
+                <a16:creationId xmlns:a16="http://schemas.microsoft.com/office/drawing/2014/main" id="{43598EB7-284D-44E0-8024-EC7581FBBB82}"/>
+              </a:ext>
+            </a:extLst>
+          </p:cNvPr>
+          <p:cNvCxnSpPr>
+            <a:cxnSpLocks/>
+          </p:cNvCxnSpPr>
+          <p:nvPr/>
+        </p:nvCxnSpPr>
+        <p:spPr>
+          <a:xfrm flipH="1">
+            <a:off x="3738562" y="4105275"/>
+            <a:ext cx="2371725" cy="0"/>
+          </a:xfrm>
+          <a:prstGeom prst="straightConnector1">
+            <a:avLst/>
+          </a:prstGeom>
+          <a:ln w="44450">
+            <a:solidFill>
+              <a:schemeClr val="bg1"/>
+            </a:solidFill>
+            <a:tailEnd type="triangle"/>
+          </a:ln>
+        </p:spPr>
+        <p:style>
+          <a:lnRef idx="1">
+            <a:schemeClr val="accent1"/>
+          </a:lnRef>
+          <a:fillRef idx="0">
+            <a:schemeClr val="accent1"/>
+          </a:fillRef>
+          <a:effectRef idx="0">
+            <a:schemeClr val="accent1"/>
+          </a:effectRef>
+          <a:fontRef idx="minor">
+            <a:schemeClr val="tx1"/>
+          </a:fontRef>
+        </p:style>
+      </p:cxnSp>
+      <p:sp>
+        <p:nvSpPr>
+          <p:cNvPr id="15" name="TextBox 14">
+            <a:extLst>
+              <a:ext uri="{FF2B5EF4-FFF2-40B4-BE49-F238E27FC236}">
+                <a16:creationId xmlns:a16="http://schemas.microsoft.com/office/drawing/2014/main" id="{8E7F5543-EC47-42E8-9611-D1BE21B76944}"/>
+              </a:ext>
+            </a:extLst>
+          </p:cNvPr>
+          <p:cNvSpPr txBox="1"/>
+          <p:nvPr/>
+        </p:nvSpPr>
+        <p:spPr>
+          <a:xfrm>
+            <a:off x="4164806" y="3676410"/>
+            <a:ext cx="1519238" cy="369332"/>
+          </a:xfrm>
+          <a:prstGeom prst="rect">
+            <a:avLst/>
+          </a:prstGeom>
+          <a:noFill/>
+        </p:spPr>
+        <p:txBody>
+          <a:bodyPr wrap="square" rtlCol="0">
+            <a:spAutoFit/>
+          </a:bodyPr>
+          <a:lstStyle/>
+          <a:p>
+            <a:r>
+              <a:rPr lang="en-US" dirty="0">
+                <a:solidFill>
+                  <a:schemeClr val="bg1"/>
+                </a:solidFill>
+              </a:rPr>
+              <a:t>Bot Notifies</a:t>
+            </a:r>
+          </a:p>
+        </p:txBody>
+      </p:sp>
+      <p:pic>
+        <p:nvPicPr>
+          <p:cNvPr id="24" name="Picture 23" descr="A picture containing transport&#10;&#10;Description generated with very high confidence">
+            <a:extLst>
+              <a:ext uri="{FF2B5EF4-FFF2-40B4-BE49-F238E27FC236}">
+                <a16:creationId xmlns:a16="http://schemas.microsoft.com/office/drawing/2014/main" id="{2254D02B-7262-43CE-B852-398C4F9B4BD7}"/>
+              </a:ext>
+            </a:extLst>
+          </p:cNvPr>
+          <p:cNvPicPr>
+            <a:picLocks noChangeAspect="1"/>
+          </p:cNvPicPr>
+          <p:nvPr/>
+        </p:nvPicPr>
+        <p:blipFill>
+          <a:blip r:embed="rId2">
+            <a:extLst>
+              <a:ext uri="{28A0092B-C50C-407E-A947-70E740481C1C}">
+                <a14:useLocalDpi xmlns:a14="http://schemas.microsoft.com/office/drawing/2010/main" val="0"/>
+              </a:ext>
+            </a:extLst>
+          </a:blip>
+          <a:stretch>
+            <a:fillRect/>
+          </a:stretch>
+        </p:blipFill>
+        <p:spPr>
+          <a:xfrm>
+            <a:off x="8334375" y="2954615"/>
+            <a:ext cx="990600" cy="990600"/>
+          </a:xfrm>
+          <a:prstGeom prst="rect">
+            <a:avLst/>
+          </a:prstGeom>
+          <a:solidFill>
+            <a:srgbClr val="002060"/>
+          </a:solidFill>
+        </p:spPr>
+      </p:pic>
+      <p:cxnSp>
+        <p:nvCxnSpPr>
+          <p:cNvPr id="25" name="Straight Arrow Connector 24">
+            <a:extLst>
+              <a:ext uri="{FF2B5EF4-FFF2-40B4-BE49-F238E27FC236}">
+                <a16:creationId xmlns:a16="http://schemas.microsoft.com/office/drawing/2014/main" id="{FEA319F7-760B-4986-BDF1-05A45BA13F4A}"/>
+              </a:ext>
+            </a:extLst>
+          </p:cNvPr>
+          <p:cNvCxnSpPr>
+            <a:cxnSpLocks/>
+          </p:cNvCxnSpPr>
+          <p:nvPr/>
+        </p:nvCxnSpPr>
+        <p:spPr>
+          <a:xfrm flipH="1" flipV="1">
+            <a:off x="7458076" y="3429000"/>
+            <a:ext cx="876299" cy="20915"/>
+          </a:xfrm>
+          <a:prstGeom prst="straightConnector1">
+            <a:avLst/>
+          </a:prstGeom>
+          <a:ln w="44450">
+            <a:solidFill>
+              <a:schemeClr val="bg1"/>
+            </a:solidFill>
+            <a:tailEnd type="triangle"/>
+          </a:ln>
+        </p:spPr>
+        <p:style>
+          <a:lnRef idx="1">
+            <a:schemeClr val="accent1"/>
+          </a:lnRef>
+          <a:fillRef idx="0">
+            <a:schemeClr val="accent1"/>
+          </a:fillRef>
+          <a:effectRef idx="0">
+            <a:schemeClr val="accent1"/>
+          </a:effectRef>
+          <a:fontRef idx="minor">
+            <a:schemeClr val="tx1"/>
+          </a:fontRef>
+        </p:style>
+      </p:cxnSp>
+    </p:spTree>
+    <p:extLst>
+      <p:ext uri="{BB962C8B-B14F-4D97-AF65-F5344CB8AC3E}">
+        <p14:creationId xmlns:p14="http://schemas.microsoft.com/office/powerpoint/2010/main" val="1581205457"/>
+      </p:ext>
+    </p:extLst>
+  </p:cSld>
+  <p:clrMapOvr>
+    <a:masterClrMapping/>
+  </p:clrMapOvr>
+  <p:timing>
+    <p:tnLst>
+      <p:par>
+        <p:cTn id="1" dur="indefinite" restart="never" nodeType="tmRoot">
+          <p:childTnLst>
+            <p:seq concurrent="1" nextAc="seek">
+              <p:cTn id="2" dur="indefinite" nodeType="mainSeq">
+                <p:childTnLst>
+                  <p:par>
+                    <p:cTn id="3" fill="hold">
+                      <p:stCondLst>
+                        <p:cond delay="indefinite"/>
+                      </p:stCondLst>
+                      <p:childTnLst>
+                        <p:par>
+                          <p:cTn id="4" fill="hold">
+                            <p:stCondLst>
+                              <p:cond delay="0"/>
+                            </p:stCondLst>
+                            <p:childTnLst>
+                              <p:par>
+                                <p:cTn id="5" presetID="10" presetClass="entr" presetSubtype="0" fill="hold" nodeType="clickEffect">
+                                  <p:stCondLst>
+                                    <p:cond delay="0"/>
+                                  </p:stCondLst>
+                                  <p:childTnLst>
+                                    <p:set>
+                                      <p:cBhvr>
+                                        <p:cTn id="6" dur="1" fill="hold">
+                                          <p:stCondLst>
+                                            <p:cond delay="0"/>
+                                          </p:stCondLst>
+                                        </p:cTn>
+                                        <p:tgtEl>
+                                          <p:spTgt spid="24"/>
+                                        </p:tgtEl>
+                                        <p:attrNameLst>
+                                          <p:attrName>style.visibility</p:attrName>
+                                        </p:attrNameLst>
+                                      </p:cBhvr>
+                                      <p:to>
+                                        <p:strVal val="visible"/>
+                                      </p:to>
+                                    </p:set>
+                                    <p:animEffect transition="in" filter="fade">
+                                      <p:cBhvr>
+                                        <p:cTn id="7" dur="500"/>
+                                        <p:tgtEl>
+                                          <p:spTgt spid="24"/>
+                                        </p:tgtEl>
+                                      </p:cBhvr>
+                                    </p:animEffect>
+                                  </p:childTnLst>
+                                </p:cTn>
+                              </p:par>
+                            </p:childTnLst>
+                          </p:cTn>
+                        </p:par>
+                      </p:childTnLst>
+                    </p:cTn>
+                  </p:par>
+                  <p:par>
+                    <p:cTn id="8" fill="hold">
+                      <p:stCondLst>
+                        <p:cond delay="indefinite"/>
+                      </p:stCondLst>
+                      <p:childTnLst>
+                        <p:par>
+                          <p:cTn id="9" fill="hold">
+                            <p:stCondLst>
+                              <p:cond delay="0"/>
+                            </p:stCondLst>
+                            <p:childTnLst>
+                              <p:par>
+                                <p:cTn id="10" presetID="10" presetClass="entr" presetSubtype="0" fill="hold" nodeType="clickEffect">
+                                  <p:stCondLst>
+                                    <p:cond delay="0"/>
+                                  </p:stCondLst>
+                                  <p:childTnLst>
+                                    <p:set>
+                                      <p:cBhvr>
+                                        <p:cTn id="11" dur="1" fill="hold">
+                                          <p:stCondLst>
+                                            <p:cond delay="0"/>
+                                          </p:stCondLst>
+                                        </p:cTn>
+                                        <p:tgtEl>
+                                          <p:spTgt spid="25"/>
+                                        </p:tgtEl>
+                                        <p:attrNameLst>
+                                          <p:attrName>style.visibility</p:attrName>
+                                        </p:attrNameLst>
+                                      </p:cBhvr>
+                                      <p:to>
+                                        <p:strVal val="visible"/>
+                                      </p:to>
+                                    </p:set>
+                                    <p:animEffect transition="in" filter="fade">
+                                      <p:cBhvr>
+                                        <p:cTn id="12" dur="500"/>
+                                        <p:tgtEl>
+                                          <p:spTgt spid="25"/>
+                                        </p:tgtEl>
+                                      </p:cBhvr>
+                                    </p:animEffect>
+                                  </p:childTnLst>
+                                </p:cTn>
+                              </p:par>
+                            </p:childTnLst>
+                          </p:cTn>
+                        </p:par>
+                      </p:childTnLst>
+                    </p:cTn>
+                  </p:par>
+                  <p:par>
+                    <p:cTn id="13" fill="hold">
+                      <p:stCondLst>
+                        <p:cond delay="indefinite"/>
+                      </p:stCondLst>
+                      <p:childTnLst>
+                        <p:par>
+                          <p:cTn id="14" fill="hold">
+                            <p:stCondLst>
+                              <p:cond delay="0"/>
+                            </p:stCondLst>
+                            <p:childTnLst>
+                              <p:par>
+                                <p:cTn id="15" presetID="10" presetClass="entr" presetSubtype="0" fill="hold" grpId="0" nodeType="clickEffect">
+                                  <p:stCondLst>
+                                    <p:cond delay="0"/>
+                                  </p:stCondLst>
+                                  <p:childTnLst>
+                                    <p:set>
+                                      <p:cBhvr>
+                                        <p:cTn id="16" dur="1" fill="hold">
+                                          <p:stCondLst>
+                                            <p:cond delay="0"/>
+                                          </p:stCondLst>
+                                        </p:cTn>
+                                        <p:tgtEl>
+                                          <p:spTgt spid="15"/>
+                                        </p:tgtEl>
+                                        <p:attrNameLst>
+                                          <p:attrName>style.visibility</p:attrName>
+                                        </p:attrNameLst>
+                                      </p:cBhvr>
+                                      <p:to>
+                                        <p:strVal val="visible"/>
+                                      </p:to>
+                                    </p:set>
+                                    <p:animEffect transition="in" filter="fade">
+                                      <p:cBhvr>
+                                        <p:cTn id="17" dur="500"/>
+                                        <p:tgtEl>
+                                          <p:spTgt spid="15"/>
+                                        </p:tgtEl>
+                                      </p:cBhvr>
+                                    </p:animEffect>
+                                  </p:childTnLst>
+                                </p:cTn>
+                              </p:par>
+                            </p:childTnLst>
+                          </p:cTn>
+                        </p:par>
+                      </p:childTnLst>
+                    </p:cTn>
+                  </p:par>
+                  <p:par>
+                    <p:cTn id="18" fill="hold">
+                      <p:stCondLst>
+                        <p:cond delay="indefinite"/>
+                      </p:stCondLst>
+                      <p:childTnLst>
+                        <p:par>
+                          <p:cTn id="19" fill="hold">
+                            <p:stCondLst>
+                              <p:cond delay="0"/>
+                            </p:stCondLst>
+                            <p:childTnLst>
+                              <p:par>
+                                <p:cTn id="20" presetID="10" presetClass="entr" presetSubtype="0" fill="hold" nodeType="clickEffect">
+                                  <p:stCondLst>
+                                    <p:cond delay="0"/>
+                                  </p:stCondLst>
+                                  <p:childTnLst>
+                                    <p:set>
+                                      <p:cBhvr>
+                                        <p:cTn id="21" dur="1" fill="hold">
+                                          <p:stCondLst>
+                                            <p:cond delay="0"/>
+                                          </p:stCondLst>
+                                        </p:cTn>
+                                        <p:tgtEl>
+                                          <p:spTgt spid="14"/>
+                                        </p:tgtEl>
+                                        <p:attrNameLst>
+                                          <p:attrName>style.visibility</p:attrName>
+                                        </p:attrNameLst>
+                                      </p:cBhvr>
+                                      <p:to>
+                                        <p:strVal val="visible"/>
+                                      </p:to>
+                                    </p:set>
+                                    <p:animEffect transition="in" filter="fade">
+                                      <p:cBhvr>
+                                        <p:cTn id="22" dur="500"/>
+                                        <p:tgtEl>
+                                          <p:spTgt spid="14"/>
+                                        </p:tgtEl>
+                                      </p:cBhvr>
+                                    </p:animEffect>
+                                  </p:childTnLst>
+                                </p:cTn>
+                              </p:par>
+                            </p:childTnLst>
+                          </p:cTn>
+                        </p:par>
+                      </p:childTnLst>
+                    </p:cTn>
+                  </p:par>
+                </p:childTnLst>
+              </p:cTn>
+              <p:prevCondLst>
+                <p:cond evt="onPrev" delay="0">
+                  <p:tgtEl>
+                    <p:sldTgt/>
+                  </p:tgtEl>
+                </p:cond>
+              </p:prevCondLst>
+              <p:nextCondLst>
+                <p:cond evt="onNext" delay="0">
+                  <p:tgtEl>
+                    <p:sldTgt/>
+                  </p:tgtEl>
+                </p:cond>
+              </p:nextCondLst>
+            </p:seq>
+          </p:childTnLst>
+        </p:cTn>
+      </p:par>
+    </p:tnLst>
+    <p:bldLst>
+      <p:bldP spid="15" grpId="0"/>
+    </p:bldLst>
+  </p:timing>
+</p:sld>
+</file>
+
+<file path=ppt/slides/slide4.xml><?xml version="1.0" encoding="utf-8"?>
+<p:sld xmlns:a="http://schemas.openxmlformats.org/drawingml/2006/main" xmlns:r="http://schemas.openxmlformats.org/officeDocument/2006/relationships" xmlns:p="http://schemas.openxmlformats.org/presentationml/2006/main">
+  <p:cSld>
+    <p:bg>
+      <p:bgPr>
+        <a:solidFill>
+          <a:srgbClr val="002060"/>
+        </a:solidFill>
+        <a:effectLst/>
+      </p:bgPr>
+    </p:bg>
+    <p:spTree>
+      <p:nvGrpSpPr>
+        <p:cNvPr id="1" name=""/>
+        <p:cNvGrpSpPr/>
+        <p:nvPr/>
+      </p:nvGrpSpPr>
+      <p:grpSpPr>
+        <a:xfrm>
+          <a:off x="0" y="0"/>
+          <a:ext cx="0" cy="0"/>
+          <a:chOff x="0" y="0"/>
+          <a:chExt cx="0" cy="0"/>
+        </a:xfrm>
+      </p:grpSpPr>
+      <p:pic>
+        <p:nvPicPr>
+          <p:cNvPr id="3078" name="Picture 6" descr="Image result for azure function">
+            <a:extLst>
+              <a:ext uri="{FF2B5EF4-FFF2-40B4-BE49-F238E27FC236}">
+                <a16:creationId xmlns:a16="http://schemas.microsoft.com/office/drawing/2014/main" id="{2A9F8090-45D2-4DD3-9E3C-15AF8A8F18C6}"/>
+              </a:ext>
+            </a:extLst>
+          </p:cNvPr>
+          <p:cNvPicPr>
+            <a:picLocks noChangeAspect="1" noChangeArrowheads="1"/>
+          </p:cNvPicPr>
+          <p:nvPr/>
+        </p:nvPicPr>
+        <p:blipFill>
+          <a:blip r:embed="rId2">
+            <a:extLst>
+              <a:ext uri="{28A0092B-C50C-407E-A947-70E740481C1C}">
+                <a14:useLocalDpi xmlns:a14="http://schemas.microsoft.com/office/drawing/2010/main" val="0"/>
+              </a:ext>
+            </a:extLst>
+          </a:blip>
+          <a:srcRect/>
+          <a:stretch>
+            <a:fillRect/>
+          </a:stretch>
+        </p:blipFill>
+        <p:spPr bwMode="auto">
+          <a:xfrm>
+            <a:off x="320040" y="593745"/>
+            <a:ext cx="3425609" cy="3425609"/>
+          </a:xfrm>
+          <a:prstGeom prst="rect">
+            <a:avLst/>
+          </a:prstGeom>
+          <a:noFill/>
+          <a:extLst>
+            <a:ext uri="{909E8E84-426E-40DD-AFC4-6F175D3DCCD1}">
+              <a14:hiddenFill xmlns:a14="http://schemas.microsoft.com/office/drawing/2010/main">
+                <a:solidFill>
+                  <a:srgbClr val="FFFFFF"/>
+                </a:solidFill>
+              </a14:hiddenFill>
+            </a:ext>
+          </a:extLst>
+        </p:spPr>
+      </p:pic>
+      <p:pic>
+        <p:nvPicPr>
+          <p:cNvPr id="3076" name="Picture 4" descr="Related image">
+            <a:extLst>
+              <a:ext uri="{FF2B5EF4-FFF2-40B4-BE49-F238E27FC236}">
+                <a16:creationId xmlns:a16="http://schemas.microsoft.com/office/drawing/2014/main" id="{618AAC33-F261-4313-94FC-4CA821123CB1}"/>
+              </a:ext>
+            </a:extLst>
+          </p:cNvPr>
+          <p:cNvPicPr>
+            <a:picLocks noChangeAspect="1" noChangeArrowheads="1"/>
+          </p:cNvPicPr>
+          <p:nvPr/>
+        </p:nvPicPr>
+        <p:blipFill>
+          <a:blip r:embed="rId3">
+            <a:extLst>
+              <a:ext uri="{28A0092B-C50C-407E-A947-70E740481C1C}">
+                <a14:useLocalDpi xmlns:a14="http://schemas.microsoft.com/office/drawing/2010/main" val="0"/>
+              </a:ext>
+            </a:extLst>
+          </a:blip>
+          <a:srcRect/>
+          <a:stretch>
+            <a:fillRect/>
+          </a:stretch>
+        </p:blipFill>
+        <p:spPr bwMode="auto">
+          <a:xfrm>
+            <a:off x="4385729" y="589887"/>
+            <a:ext cx="3433324" cy="3433324"/>
+          </a:xfrm>
+          <a:prstGeom prst="rect">
+            <a:avLst/>
+          </a:prstGeom>
+          <a:noFill/>
+          <a:extLst>
+            <a:ext uri="{909E8E84-426E-40DD-AFC4-6F175D3DCCD1}">
+              <a14:hiddenFill xmlns:a14="http://schemas.microsoft.com/office/drawing/2010/main">
+                <a:solidFill>
+                  <a:srgbClr val="FFFFFF"/>
+                </a:solidFill>
+              </a14:hiddenFill>
+            </a:ext>
+          </a:extLst>
+        </p:spPr>
+      </p:pic>
+      <p:sp>
+        <p:nvSpPr>
+          <p:cNvPr id="2" name="Title 1">
+            <a:extLst>
+              <a:ext uri="{FF2B5EF4-FFF2-40B4-BE49-F238E27FC236}">
+                <a16:creationId xmlns:a16="http://schemas.microsoft.com/office/drawing/2014/main" id="{53A0A419-7434-4EBB-9C08-2B02C6DE026B}"/>
+              </a:ext>
+            </a:extLst>
+          </p:cNvPr>
+          <p:cNvSpPr>
+            <a:spLocks noGrp="1"/>
+          </p:cNvSpPr>
+          <p:nvPr>
+            <p:ph type="title"/>
+          </p:nvPr>
+        </p:nvSpPr>
+        <p:spPr>
+          <a:xfrm>
+            <a:off x="532464" y="4787118"/>
+            <a:ext cx="11139854" cy="930447"/>
+          </a:xfrm>
+          <a:solidFill>
+            <a:schemeClr val="bg2"/>
+          </a:solidFill>
+        </p:spPr>
+        <p:txBody>
+          <a:bodyPr vert="horz" lIns="91440" tIns="45720" rIns="91440" bIns="45720" rtlCol="0" anchor="b">
+            <a:normAutofit/>
+          </a:bodyPr>
+          <a:lstStyle/>
+          <a:p>
+            <a:pPr algn="ctr"/>
+            <a:r>
+              <a:rPr lang="en-US" sz="5400" dirty="0">
+                <a:latin typeface="Segoe UI Light" panose="020B0502040204020203" pitchFamily="34" charset="0"/>
+                <a:cs typeface="Segoe UI Light" panose="020B0502040204020203" pitchFamily="34" charset="0"/>
+              </a:rPr>
+              <a:t>Proactive Bot Design</a:t>
+            </a:r>
+          </a:p>
+        </p:txBody>
+      </p:sp>
+      <p:sp>
+        <p:nvSpPr>
+          <p:cNvPr id="5" name="TextBox 4">
+            <a:extLst>
+              <a:ext uri="{FF2B5EF4-FFF2-40B4-BE49-F238E27FC236}">
+                <a16:creationId xmlns:a16="http://schemas.microsoft.com/office/drawing/2014/main" id="{D112D920-D7A1-449E-8E77-44AAFF28F3FC}"/>
+              </a:ext>
+            </a:extLst>
+          </p:cNvPr>
+          <p:cNvSpPr txBox="1"/>
+          <p:nvPr/>
+        </p:nvSpPr>
+        <p:spPr>
+          <a:xfrm>
+            <a:off x="4305303" y="3965921"/>
+            <a:ext cx="3513750" cy="369332"/>
+          </a:xfrm>
+          <a:prstGeom prst="rect">
+            <a:avLst/>
+          </a:prstGeom>
+          <a:noFill/>
+        </p:spPr>
+        <p:txBody>
+          <a:bodyPr wrap="square" rtlCol="0">
+            <a:spAutoFit/>
+          </a:bodyPr>
+          <a:lstStyle/>
+          <a:p>
+            <a:pPr algn="ctr"/>
+            <a:r>
+              <a:rPr lang="en-US" b="1" dirty="0">
+                <a:solidFill>
+                  <a:srgbClr val="0070C0"/>
+                </a:solidFill>
+                <a:latin typeface="Segoe UI Light" panose="020B0502040204020203" pitchFamily="34" charset="0"/>
+                <a:cs typeface="Segoe UI Light" panose="020B0502040204020203" pitchFamily="34" charset="0"/>
+              </a:rPr>
+              <a:t>Azure Storage Queue</a:t>
+            </a:r>
+          </a:p>
+        </p:txBody>
+      </p:sp>
+      <p:sp>
+        <p:nvSpPr>
+          <p:cNvPr id="13" name="TextBox 12">
+            <a:extLst>
+              <a:ext uri="{FF2B5EF4-FFF2-40B4-BE49-F238E27FC236}">
+                <a16:creationId xmlns:a16="http://schemas.microsoft.com/office/drawing/2014/main" id="{137E5697-6001-42E9-919C-8A78488ACACA}"/>
+              </a:ext>
+            </a:extLst>
+          </p:cNvPr>
+          <p:cNvSpPr txBox="1"/>
+          <p:nvPr/>
+        </p:nvSpPr>
+        <p:spPr>
+          <a:xfrm>
+            <a:off x="159571" y="3930402"/>
+            <a:ext cx="3513750" cy="369332"/>
+          </a:xfrm>
+          <a:prstGeom prst="rect">
+            <a:avLst/>
+          </a:prstGeom>
+          <a:noFill/>
+        </p:spPr>
+        <p:txBody>
+          <a:bodyPr wrap="square" rtlCol="0">
+            <a:spAutoFit/>
+          </a:bodyPr>
+          <a:lstStyle/>
+          <a:p>
+            <a:pPr algn="ctr"/>
+            <a:r>
+              <a:rPr lang="en-US" b="1" dirty="0">
+                <a:solidFill>
+                  <a:srgbClr val="0070C0"/>
+                </a:solidFill>
+                <a:latin typeface="Segoe UI Light" panose="020B0502040204020203" pitchFamily="34" charset="0"/>
+                <a:cs typeface="Segoe UI Light" panose="020B0502040204020203" pitchFamily="34" charset="0"/>
+              </a:rPr>
+              <a:t>Azure Function</a:t>
+            </a:r>
+          </a:p>
+        </p:txBody>
+      </p:sp>
+      <p:pic>
+        <p:nvPicPr>
+          <p:cNvPr id="3080" name="Picture 8" descr="Image result for bot framework logo">
+            <a:extLst>
+              <a:ext uri="{FF2B5EF4-FFF2-40B4-BE49-F238E27FC236}">
+                <a16:creationId xmlns:a16="http://schemas.microsoft.com/office/drawing/2014/main" id="{535D0945-4D2F-4152-B69B-85C0FF54188A}"/>
+              </a:ext>
+            </a:extLst>
+          </p:cNvPr>
+          <p:cNvPicPr>
+            <a:picLocks noChangeAspect="1" noChangeArrowheads="1"/>
+          </p:cNvPicPr>
+          <p:nvPr/>
+        </p:nvPicPr>
+        <p:blipFill>
+          <a:blip r:embed="rId4">
+            <a:extLst>
+              <a:ext uri="{28A0092B-C50C-407E-A947-70E740481C1C}">
+                <a14:useLocalDpi xmlns:a14="http://schemas.microsoft.com/office/drawing/2010/main" val="0"/>
+              </a:ext>
+            </a:extLst>
+          </a:blip>
+          <a:srcRect/>
+          <a:stretch>
+            <a:fillRect/>
+          </a:stretch>
+        </p:blipFill>
+        <p:spPr bwMode="auto">
+          <a:xfrm>
+            <a:off x="7353300" y="724266"/>
+            <a:ext cx="5715000" cy="3000375"/>
+          </a:xfrm>
+          <a:prstGeom prst="rect">
+            <a:avLst/>
+          </a:prstGeom>
+          <a:noFill/>
+          <a:extLst>
+            <a:ext uri="{909E8E84-426E-40DD-AFC4-6F175D3DCCD1}">
+              <a14:hiddenFill xmlns:a14="http://schemas.microsoft.com/office/drawing/2010/main">
+                <a:solidFill>
+                  <a:srgbClr val="FFFFFF"/>
+                </a:solidFill>
+              </a14:hiddenFill>
+            </a:ext>
+          </a:extLst>
+        </p:spPr>
+      </p:pic>
+      <p:sp>
+        <p:nvSpPr>
+          <p:cNvPr id="17" name="TextBox 16">
+            <a:extLst>
+              <a:ext uri="{FF2B5EF4-FFF2-40B4-BE49-F238E27FC236}">
+                <a16:creationId xmlns:a16="http://schemas.microsoft.com/office/drawing/2014/main" id="{A922FA93-A89C-4C3F-9956-BBECDA9F8577}"/>
+              </a:ext>
+            </a:extLst>
+          </p:cNvPr>
+          <p:cNvSpPr txBox="1"/>
+          <p:nvPr/>
+        </p:nvSpPr>
+        <p:spPr>
+          <a:xfrm>
+            <a:off x="8369298" y="3853774"/>
+            <a:ext cx="3513750" cy="369332"/>
+          </a:xfrm>
+          <a:prstGeom prst="rect">
+            <a:avLst/>
+          </a:prstGeom>
+          <a:noFill/>
+        </p:spPr>
+        <p:txBody>
+          <a:bodyPr wrap="square" rtlCol="0">
+            <a:spAutoFit/>
+          </a:bodyPr>
+          <a:lstStyle/>
+          <a:p>
+            <a:pPr algn="ctr"/>
+            <a:r>
+              <a:rPr lang="en-US" b="1" dirty="0">
+                <a:solidFill>
+                  <a:srgbClr val="0070C0"/>
+                </a:solidFill>
+                <a:latin typeface="Segoe UI Light" panose="020B0502040204020203" pitchFamily="34" charset="0"/>
+                <a:cs typeface="Segoe UI Light" panose="020B0502040204020203" pitchFamily="34" charset="0"/>
+              </a:rPr>
+              <a:t>Bot framework + Direct Line API</a:t>
+            </a:r>
+          </a:p>
+        </p:txBody>
+      </p:sp>
+    </p:spTree>
+    <p:extLst>
+      <p:ext uri="{BB962C8B-B14F-4D97-AF65-F5344CB8AC3E}">
+        <p14:creationId xmlns:p14="http://schemas.microsoft.com/office/powerpoint/2010/main" val="4195396416"/>
+      </p:ext>
+    </p:extLst>
+  </p:cSld>
+  <p:clrMapOvr>
+    <a:masterClrMapping/>
+  </p:clrMapOvr>
+</p:sld>
+</file>
+
+<file path=ppt/slides/slide5.xml><?xml version="1.0" encoding="utf-8"?>
+<p:sld xmlns:a="http://schemas.openxmlformats.org/drawingml/2006/main" xmlns:r="http://schemas.openxmlformats.org/officeDocument/2006/relationships" xmlns:p="http://schemas.openxmlformats.org/presentationml/2006/main">
+  <p:cSld>
+    <p:bg>
+      <p:bgPr>
+        <a:solidFill>
+          <a:srgbClr val="002060"/>
+        </a:solidFill>
+        <a:effectLst/>
+      </p:bgPr>
+    </p:bg>
+    <p:spTree>
+      <p:nvGrpSpPr>
+        <p:cNvPr id="1" name=""/>
+        <p:cNvGrpSpPr/>
+        <p:nvPr/>
+      </p:nvGrpSpPr>
+      <p:grpSpPr>
+        <a:xfrm>
+          <a:off x="0" y="0"/>
+          <a:ext cx="0" cy="0"/>
+          <a:chOff x="0" y="0"/>
+          <a:chExt cx="0" cy="0"/>
+        </a:xfrm>
+      </p:grpSpPr>
+      <p:sp>
+        <p:nvSpPr>
+          <p:cNvPr id="2" name="Title 1">
+            <a:extLst>
+              <a:ext uri="{FF2B5EF4-FFF2-40B4-BE49-F238E27FC236}">
                 <a16:creationId xmlns:a16="http://schemas.microsoft.com/office/drawing/2014/main" id="{4EA5367D-FD20-49BE-9193-B4DB17850485}"/>
               </a:ext>
             </a:extLst>
@@ -7861,7 +9272,7 @@
                 <a:latin typeface="Segoe UI Light" panose="020B0502040204020203" pitchFamily="34" charset="0"/>
                 <a:cs typeface="Segoe UI Light" panose="020B0502040204020203" pitchFamily="34" charset="0"/>
               </a:rPr>
-              <a:t>Proactive Bots</a:t>
+              <a:t>Proactive Bot Design</a:t>
             </a:r>
             <a:br>
               <a:rPr lang="en-US" sz="6600" kern="1200" dirty="0">
@@ -7946,360 +9357,13 @@
 </p:sld>
 </file>
 
-<file path=ppt/slides/slide3.xml><?xml version="1.0" encoding="utf-8"?>
+<file path=ppt/slides/slide6.xml><?xml version="1.0" encoding="utf-8"?>
 <p:sld xmlns:a="http://schemas.openxmlformats.org/drawingml/2006/main" xmlns:r="http://schemas.openxmlformats.org/officeDocument/2006/relationships" xmlns:p="http://schemas.openxmlformats.org/presentationml/2006/main">
   <p:cSld>
     <p:bg>
       <p:bgPr>
         <a:solidFill>
-          <a:schemeClr val="bg2"/>
-        </a:solidFill>
-        <a:effectLst/>
-      </p:bgPr>
-    </p:bg>
-    <p:spTree>
-      <p:nvGrpSpPr>
-        <p:cNvPr id="1" name=""/>
-        <p:cNvGrpSpPr/>
-        <p:nvPr/>
-      </p:nvGrpSpPr>
-      <p:grpSpPr>
-        <a:xfrm>
-          <a:off x="0" y="0"/>
-          <a:ext cx="0" cy="0"/>
-          <a:chOff x="0" y="0"/>
-          <a:chExt cx="0" cy="0"/>
-        </a:xfrm>
-      </p:grpSpPr>
-      <p:pic>
-        <p:nvPicPr>
-          <p:cNvPr id="3078" name="Picture 6" descr="Image result for azure function">
-            <a:extLst>
-              <a:ext uri="{FF2B5EF4-FFF2-40B4-BE49-F238E27FC236}">
-                <a16:creationId xmlns:a16="http://schemas.microsoft.com/office/drawing/2014/main" id="{2A9F8090-45D2-4DD3-9E3C-15AF8A8F18C6}"/>
-              </a:ext>
-            </a:extLst>
-          </p:cNvPr>
-          <p:cNvPicPr>
-            <a:picLocks noChangeAspect="1" noChangeArrowheads="1"/>
-          </p:cNvPicPr>
-          <p:nvPr/>
-        </p:nvPicPr>
-        <p:blipFill>
-          <a:blip r:embed="rId2">
-            <a:extLst>
-              <a:ext uri="{28A0092B-C50C-407E-A947-70E740481C1C}">
-                <a14:useLocalDpi xmlns:a14="http://schemas.microsoft.com/office/drawing/2010/main" val="0"/>
-              </a:ext>
-            </a:extLst>
-          </a:blip>
-          <a:srcRect/>
-          <a:stretch>
-            <a:fillRect/>
-          </a:stretch>
-        </p:blipFill>
-        <p:spPr bwMode="auto">
-          <a:xfrm>
-            <a:off x="320040" y="593745"/>
-            <a:ext cx="3425609" cy="3425609"/>
-          </a:xfrm>
-          <a:prstGeom prst="rect">
-            <a:avLst/>
-          </a:prstGeom>
-          <a:noFill/>
-          <a:extLst>
-            <a:ext uri="{909E8E84-426E-40DD-AFC4-6F175D3DCCD1}">
-              <a14:hiddenFill xmlns:a14="http://schemas.microsoft.com/office/drawing/2010/main">
-                <a:solidFill>
-                  <a:srgbClr val="FFFFFF"/>
-                </a:solidFill>
-              </a14:hiddenFill>
-            </a:ext>
-          </a:extLst>
-        </p:spPr>
-      </p:pic>
-      <p:pic>
-        <p:nvPicPr>
-          <p:cNvPr id="3076" name="Picture 4" descr="Related image">
-            <a:extLst>
-              <a:ext uri="{FF2B5EF4-FFF2-40B4-BE49-F238E27FC236}">
-                <a16:creationId xmlns:a16="http://schemas.microsoft.com/office/drawing/2014/main" id="{618AAC33-F261-4313-94FC-4CA821123CB1}"/>
-              </a:ext>
-            </a:extLst>
-          </p:cNvPr>
-          <p:cNvPicPr>
-            <a:picLocks noChangeAspect="1" noChangeArrowheads="1"/>
-          </p:cNvPicPr>
-          <p:nvPr/>
-        </p:nvPicPr>
-        <p:blipFill>
-          <a:blip r:embed="rId3">
-            <a:extLst>
-              <a:ext uri="{28A0092B-C50C-407E-A947-70E740481C1C}">
-                <a14:useLocalDpi xmlns:a14="http://schemas.microsoft.com/office/drawing/2010/main" val="0"/>
-              </a:ext>
-            </a:extLst>
-          </a:blip>
-          <a:srcRect/>
-          <a:stretch>
-            <a:fillRect/>
-          </a:stretch>
-        </p:blipFill>
-        <p:spPr bwMode="auto">
-          <a:xfrm>
-            <a:off x="4385729" y="589887"/>
-            <a:ext cx="3433324" cy="3433324"/>
-          </a:xfrm>
-          <a:prstGeom prst="rect">
-            <a:avLst/>
-          </a:prstGeom>
-          <a:noFill/>
-          <a:extLst>
-            <a:ext uri="{909E8E84-426E-40DD-AFC4-6F175D3DCCD1}">
-              <a14:hiddenFill xmlns:a14="http://schemas.microsoft.com/office/drawing/2010/main">
-                <a:solidFill>
-                  <a:srgbClr val="FFFFFF"/>
-                </a:solidFill>
-              </a14:hiddenFill>
-            </a:ext>
-          </a:extLst>
-        </p:spPr>
-      </p:pic>
-      <p:sp>
-        <p:nvSpPr>
-          <p:cNvPr id="2" name="Title 1">
-            <a:extLst>
-              <a:ext uri="{FF2B5EF4-FFF2-40B4-BE49-F238E27FC236}">
-                <a16:creationId xmlns:a16="http://schemas.microsoft.com/office/drawing/2014/main" id="{53A0A419-7434-4EBB-9C08-2B02C6DE026B}"/>
-              </a:ext>
-            </a:extLst>
-          </p:cNvPr>
-          <p:cNvSpPr>
-            <a:spLocks noGrp="1"/>
-          </p:cNvSpPr>
-          <p:nvPr>
-            <p:ph type="title"/>
-          </p:nvPr>
-        </p:nvSpPr>
-        <p:spPr>
-          <a:xfrm>
-            <a:off x="532464" y="4787118"/>
-            <a:ext cx="11139854" cy="930447"/>
-          </a:xfrm>
-          <a:solidFill>
-            <a:schemeClr val="bg2"/>
-          </a:solidFill>
-        </p:spPr>
-        <p:txBody>
-          <a:bodyPr vert="horz" lIns="91440" tIns="45720" rIns="91440" bIns="45720" rtlCol="0" anchor="b">
-            <a:normAutofit/>
-          </a:bodyPr>
-          <a:lstStyle/>
-          <a:p>
-            <a:pPr algn="ctr"/>
-            <a:r>
-              <a:rPr lang="en-US" sz="5400" dirty="0">
-                <a:latin typeface="Segoe UI Light" panose="020B0502040204020203" pitchFamily="34" charset="0"/>
-                <a:cs typeface="Segoe UI Light" panose="020B0502040204020203" pitchFamily="34" charset="0"/>
-              </a:rPr>
-              <a:t>Proactive Bot Design</a:t>
-            </a:r>
-          </a:p>
-        </p:txBody>
-      </p:sp>
-      <p:sp>
-        <p:nvSpPr>
-          <p:cNvPr id="5" name="TextBox 4">
-            <a:extLst>
-              <a:ext uri="{FF2B5EF4-FFF2-40B4-BE49-F238E27FC236}">
-                <a16:creationId xmlns:a16="http://schemas.microsoft.com/office/drawing/2014/main" id="{D112D920-D7A1-449E-8E77-44AAFF28F3FC}"/>
-              </a:ext>
-            </a:extLst>
-          </p:cNvPr>
-          <p:cNvSpPr txBox="1"/>
-          <p:nvPr/>
-        </p:nvSpPr>
-        <p:spPr>
-          <a:xfrm>
-            <a:off x="4305303" y="3965921"/>
-            <a:ext cx="3513750" cy="369332"/>
-          </a:xfrm>
-          <a:prstGeom prst="rect">
-            <a:avLst/>
-          </a:prstGeom>
-          <a:noFill/>
-        </p:spPr>
-        <p:txBody>
-          <a:bodyPr wrap="square" rtlCol="0">
-            <a:spAutoFit/>
-          </a:bodyPr>
-          <a:lstStyle/>
-          <a:p>
-            <a:pPr algn="ctr"/>
-            <a:r>
-              <a:rPr lang="en-US" b="1" dirty="0">
-                <a:solidFill>
-                  <a:srgbClr val="0070C0"/>
-                </a:solidFill>
-                <a:latin typeface="Segoe UI Light" panose="020B0502040204020203" pitchFamily="34" charset="0"/>
-                <a:cs typeface="Segoe UI Light" panose="020B0502040204020203" pitchFamily="34" charset="0"/>
-              </a:rPr>
-              <a:t>Azure Storage Queue</a:t>
-            </a:r>
-          </a:p>
-        </p:txBody>
-      </p:sp>
-      <p:sp>
-        <p:nvSpPr>
-          <p:cNvPr id="13" name="TextBox 12">
-            <a:extLst>
-              <a:ext uri="{FF2B5EF4-FFF2-40B4-BE49-F238E27FC236}">
-                <a16:creationId xmlns:a16="http://schemas.microsoft.com/office/drawing/2014/main" id="{137E5697-6001-42E9-919C-8A78488ACACA}"/>
-              </a:ext>
-            </a:extLst>
-          </p:cNvPr>
-          <p:cNvSpPr txBox="1"/>
-          <p:nvPr/>
-        </p:nvSpPr>
-        <p:spPr>
-          <a:xfrm>
-            <a:off x="159571" y="3930402"/>
-            <a:ext cx="3513750" cy="369332"/>
-          </a:xfrm>
-          <a:prstGeom prst="rect">
-            <a:avLst/>
-          </a:prstGeom>
-          <a:noFill/>
-        </p:spPr>
-        <p:txBody>
-          <a:bodyPr wrap="square" rtlCol="0">
-            <a:spAutoFit/>
-          </a:bodyPr>
-          <a:lstStyle/>
-          <a:p>
-            <a:pPr algn="ctr"/>
-            <a:r>
-              <a:rPr lang="en-US" b="1" dirty="0">
-                <a:solidFill>
-                  <a:srgbClr val="0070C0"/>
-                </a:solidFill>
-                <a:latin typeface="Segoe UI Light" panose="020B0502040204020203" pitchFamily="34" charset="0"/>
-                <a:cs typeface="Segoe UI Light" panose="020B0502040204020203" pitchFamily="34" charset="0"/>
-              </a:rPr>
-              <a:t>Azure Function</a:t>
-            </a:r>
-          </a:p>
-        </p:txBody>
-      </p:sp>
-      <p:pic>
-        <p:nvPicPr>
-          <p:cNvPr id="3080" name="Picture 8" descr="Image result for bot framework logo">
-            <a:extLst>
-              <a:ext uri="{FF2B5EF4-FFF2-40B4-BE49-F238E27FC236}">
-                <a16:creationId xmlns:a16="http://schemas.microsoft.com/office/drawing/2014/main" id="{535D0945-4D2F-4152-B69B-85C0FF54188A}"/>
-              </a:ext>
-            </a:extLst>
-          </p:cNvPr>
-          <p:cNvPicPr>
-            <a:picLocks noChangeAspect="1" noChangeArrowheads="1"/>
-          </p:cNvPicPr>
-          <p:nvPr/>
-        </p:nvPicPr>
-        <p:blipFill>
-          <a:blip r:embed="rId4">
-            <a:extLst>
-              <a:ext uri="{28A0092B-C50C-407E-A947-70E740481C1C}">
-                <a14:useLocalDpi xmlns:a14="http://schemas.microsoft.com/office/drawing/2010/main" val="0"/>
-              </a:ext>
-            </a:extLst>
-          </a:blip>
-          <a:srcRect/>
-          <a:stretch>
-            <a:fillRect/>
-          </a:stretch>
-        </p:blipFill>
-        <p:spPr bwMode="auto">
-          <a:xfrm>
-            <a:off x="7353300" y="724266"/>
-            <a:ext cx="5715000" cy="3000375"/>
-          </a:xfrm>
-          <a:prstGeom prst="rect">
-            <a:avLst/>
-          </a:prstGeom>
-          <a:noFill/>
-          <a:extLst>
-            <a:ext uri="{909E8E84-426E-40DD-AFC4-6F175D3DCCD1}">
-              <a14:hiddenFill xmlns:a14="http://schemas.microsoft.com/office/drawing/2010/main">
-                <a:solidFill>
-                  <a:srgbClr val="FFFFFF"/>
-                </a:solidFill>
-              </a14:hiddenFill>
-            </a:ext>
-          </a:extLst>
-        </p:spPr>
-      </p:pic>
-      <p:sp>
-        <p:nvSpPr>
-          <p:cNvPr id="17" name="TextBox 16">
-            <a:extLst>
-              <a:ext uri="{FF2B5EF4-FFF2-40B4-BE49-F238E27FC236}">
-                <a16:creationId xmlns:a16="http://schemas.microsoft.com/office/drawing/2014/main" id="{A922FA93-A89C-4C3F-9956-BBECDA9F8577}"/>
-              </a:ext>
-            </a:extLst>
-          </p:cNvPr>
-          <p:cNvSpPr txBox="1"/>
-          <p:nvPr/>
-        </p:nvSpPr>
-        <p:spPr>
-          <a:xfrm>
-            <a:off x="8369298" y="3853774"/>
-            <a:ext cx="3513750" cy="369332"/>
-          </a:xfrm>
-          <a:prstGeom prst="rect">
-            <a:avLst/>
-          </a:prstGeom>
-          <a:noFill/>
-        </p:spPr>
-        <p:txBody>
-          <a:bodyPr wrap="square" rtlCol="0">
-            <a:spAutoFit/>
-          </a:bodyPr>
-          <a:lstStyle/>
-          <a:p>
-            <a:pPr algn="ctr"/>
-            <a:r>
-              <a:rPr lang="en-US" b="1" dirty="0">
-                <a:solidFill>
-                  <a:srgbClr val="0070C0"/>
-                </a:solidFill>
-                <a:latin typeface="Segoe UI Light" panose="020B0502040204020203" pitchFamily="34" charset="0"/>
-                <a:cs typeface="Segoe UI Light" panose="020B0502040204020203" pitchFamily="34" charset="0"/>
-              </a:rPr>
-              <a:t>Bot framework + Direct Line API</a:t>
-            </a:r>
-          </a:p>
-        </p:txBody>
-      </p:sp>
-    </p:spTree>
-    <p:extLst>
-      <p:ext uri="{BB962C8B-B14F-4D97-AF65-F5344CB8AC3E}">
-        <p14:creationId xmlns:p14="http://schemas.microsoft.com/office/powerpoint/2010/main" val="4195396416"/>
-      </p:ext>
-    </p:extLst>
-  </p:cSld>
-  <p:clrMapOvr>
-    <a:masterClrMapping/>
-  </p:clrMapOvr>
-</p:sld>
-</file>
-
-<file path=ppt/slides/slide4.xml><?xml version="1.0" encoding="utf-8"?>
-<p:sld xmlns:a="http://schemas.openxmlformats.org/drawingml/2006/main" xmlns:r="http://schemas.openxmlformats.org/officeDocument/2006/relationships" xmlns:p="http://schemas.openxmlformats.org/presentationml/2006/main">
-  <p:cSld>
-    <p:bg>
-      <p:bgPr>
-        <a:solidFill>
-          <a:srgbClr val="7030A0"/>
+          <a:srgbClr val="002060"/>
         </a:solidFill>
         <a:effectLst/>
       </p:bgPr>
@@ -8427,13 +9491,133 @@
 </p:sld>
 </file>
 
-<file path=ppt/slides/slide5.xml><?xml version="1.0" encoding="utf-8"?>
+<file path=ppt/slides/slide7.xml><?xml version="1.0" encoding="utf-8"?>
 <p:sld xmlns:a="http://schemas.openxmlformats.org/drawingml/2006/main" xmlns:r="http://schemas.openxmlformats.org/officeDocument/2006/relationships" xmlns:p="http://schemas.openxmlformats.org/presentationml/2006/main">
   <p:cSld>
     <p:bg>
       <p:bgPr>
         <a:solidFill>
-          <a:schemeClr val="accent2"/>
+          <a:srgbClr val="002060"/>
+        </a:solidFill>
+        <a:effectLst/>
+      </p:bgPr>
+    </p:bg>
+    <p:spTree>
+      <p:nvGrpSpPr>
+        <p:cNvPr id="1" name=""/>
+        <p:cNvGrpSpPr/>
+        <p:nvPr/>
+      </p:nvGrpSpPr>
+      <p:grpSpPr>
+        <a:xfrm>
+          <a:off x="0" y="0"/>
+          <a:ext cx="0" cy="0"/>
+          <a:chOff x="0" y="0"/>
+          <a:chExt cx="0" cy="0"/>
+        </a:xfrm>
+      </p:grpSpPr>
+      <p:sp>
+        <p:nvSpPr>
+          <p:cNvPr id="2" name="Title 1">
+            <a:extLst>
+              <a:ext uri="{FF2B5EF4-FFF2-40B4-BE49-F238E27FC236}">
+                <a16:creationId xmlns:a16="http://schemas.microsoft.com/office/drawing/2014/main" id="{58E0BB1B-30A0-4C2B-B6B2-EEA4217C8B40}"/>
+              </a:ext>
+            </a:extLst>
+          </p:cNvPr>
+          <p:cNvSpPr>
+            <a:spLocks noGrp="1"/>
+          </p:cNvSpPr>
+          <p:nvPr>
+            <p:ph type="title"/>
+          </p:nvPr>
+        </p:nvSpPr>
+        <p:spPr>
+          <a:xfrm>
+            <a:off x="838200" y="2103437"/>
+            <a:ext cx="10515600" cy="1325563"/>
+          </a:xfrm>
+        </p:spPr>
+        <p:txBody>
+          <a:bodyPr/>
+          <a:lstStyle/>
+          <a:p>
+            <a:r>
+              <a:rPr lang="en-US" sz="6600" dirty="0">
+                <a:solidFill>
+                  <a:schemeClr val="bg1"/>
+                </a:solidFill>
+                <a:latin typeface="Segoe UI Light" panose="020B0502040204020203" pitchFamily="34" charset="0"/>
+                <a:cs typeface="Segoe UI Light" panose="020B0502040204020203" pitchFamily="34" charset="0"/>
+              </a:rPr>
+              <a:t>DEBUG</a:t>
+            </a:r>
+          </a:p>
+        </p:txBody>
+      </p:sp>
+      <p:sp>
+        <p:nvSpPr>
+          <p:cNvPr id="3" name="Content Placeholder 2">
+            <a:extLst>
+              <a:ext uri="{FF2B5EF4-FFF2-40B4-BE49-F238E27FC236}">
+                <a16:creationId xmlns:a16="http://schemas.microsoft.com/office/drawing/2014/main" id="{50C18075-B155-4A0E-99B8-99D2DC60536D}"/>
+              </a:ext>
+            </a:extLst>
+          </p:cNvPr>
+          <p:cNvSpPr>
+            <a:spLocks noGrp="1"/>
+          </p:cNvSpPr>
+          <p:nvPr>
+            <p:ph idx="1"/>
+          </p:nvPr>
+        </p:nvSpPr>
+        <p:spPr>
+          <a:xfrm>
+            <a:off x="909320" y="5706012"/>
+            <a:ext cx="8163560" cy="795655"/>
+          </a:xfrm>
+        </p:spPr>
+        <p:txBody>
+          <a:bodyPr>
+            <a:normAutofit/>
+          </a:bodyPr>
+          <a:lstStyle/>
+          <a:p>
+            <a:pPr marL="0" indent="0">
+              <a:buNone/>
+            </a:pPr>
+            <a:r>
+              <a:rPr lang="en-US" sz="1800" u="sng" dirty="0">
+                <a:solidFill>
+                  <a:schemeClr val="bg1"/>
+                </a:solidFill>
+                <a:latin typeface="+mj-lt"/>
+              </a:rPr>
+              <a:t>https://ngrok.com/download</a:t>
+            </a:r>
+          </a:p>
+        </p:txBody>
+      </p:sp>
+    </p:spTree>
+    <p:extLst>
+      <p:ext uri="{BB962C8B-B14F-4D97-AF65-F5344CB8AC3E}">
+        <p14:creationId xmlns:p14="http://schemas.microsoft.com/office/powerpoint/2010/main" val="63856513"/>
+      </p:ext>
+    </p:extLst>
+  </p:cSld>
+  <p:clrMapOvr>
+    <a:masterClrMapping/>
+  </p:clrMapOvr>
+</p:sld>
+</file>
+
+<file path=ppt/slides/slide8.xml><?xml version="1.0" encoding="utf-8"?>
+<p:sld xmlns:a="http://schemas.openxmlformats.org/drawingml/2006/main" xmlns:r="http://schemas.openxmlformats.org/officeDocument/2006/relationships" xmlns:p="http://schemas.openxmlformats.org/presentationml/2006/main">
+  <p:cSld>
+    <p:bg>
+      <p:bgPr>
+        <a:solidFill>
+          <a:srgbClr val="002060"/>
         </a:solidFill>
         <a:effectLst/>
       </p:bgPr>
@@ -8529,6 +9713,135 @@
     <p:extLst>
       <p:ext uri="{BB962C8B-B14F-4D97-AF65-F5344CB8AC3E}">
         <p14:creationId xmlns:p14="http://schemas.microsoft.com/office/powerpoint/2010/main" val="3863324178"/>
+      </p:ext>
+    </p:extLst>
+  </p:cSld>
+  <p:clrMapOvr>
+    <a:masterClrMapping/>
+  </p:clrMapOvr>
+</p:sld>
+</file>
+
+<file path=ppt/slides/slide9.xml><?xml version="1.0" encoding="utf-8"?>
+<p:sld xmlns:a="http://schemas.openxmlformats.org/drawingml/2006/main" xmlns:r="http://schemas.openxmlformats.org/officeDocument/2006/relationships" xmlns:p="http://schemas.openxmlformats.org/presentationml/2006/main">
+  <p:cSld>
+    <p:bg>
+      <p:bgPr>
+        <a:solidFill>
+          <a:srgbClr val="002060"/>
+        </a:solidFill>
+        <a:effectLst/>
+      </p:bgPr>
+    </p:bg>
+    <p:spTree>
+      <p:nvGrpSpPr>
+        <p:cNvPr id="1" name=""/>
+        <p:cNvGrpSpPr/>
+        <p:nvPr/>
+      </p:nvGrpSpPr>
+      <p:grpSpPr>
+        <a:xfrm>
+          <a:off x="0" y="0"/>
+          <a:ext cx="0" cy="0"/>
+          <a:chOff x="0" y="0"/>
+          <a:chExt cx="0" cy="0"/>
+        </a:xfrm>
+      </p:grpSpPr>
+      <p:sp>
+        <p:nvSpPr>
+          <p:cNvPr id="2" name="Title 1">
+            <a:extLst>
+              <a:ext uri="{FF2B5EF4-FFF2-40B4-BE49-F238E27FC236}">
+                <a16:creationId xmlns:a16="http://schemas.microsoft.com/office/drawing/2014/main" id="{58E0BB1B-30A0-4C2B-B6B2-EEA4217C8B40}"/>
+              </a:ext>
+            </a:extLst>
+          </p:cNvPr>
+          <p:cNvSpPr>
+            <a:spLocks noGrp="1"/>
+          </p:cNvSpPr>
+          <p:nvPr>
+            <p:ph type="title"/>
+          </p:nvPr>
+        </p:nvSpPr>
+        <p:spPr>
+          <a:xfrm>
+            <a:off x="838200" y="2103437"/>
+            <a:ext cx="10515600" cy="1325563"/>
+          </a:xfrm>
+        </p:spPr>
+        <p:txBody>
+          <a:bodyPr>
+            <a:normAutofit/>
+          </a:bodyPr>
+          <a:lstStyle/>
+          <a:p>
+            <a:r>
+              <a:rPr lang="en-US" sz="6600" dirty="0">
+                <a:solidFill>
+                  <a:schemeClr val="bg1"/>
+                </a:solidFill>
+                <a:latin typeface="Segoe UI Light" panose="020B0502040204020203" pitchFamily="34" charset="0"/>
+                <a:cs typeface="Segoe UI Light" panose="020B0502040204020203" pitchFamily="34" charset="0"/>
+              </a:rPr>
+              <a:t>Q &amp; A </a:t>
+            </a:r>
+          </a:p>
+        </p:txBody>
+      </p:sp>
+      <p:sp>
+        <p:nvSpPr>
+          <p:cNvPr id="3" name="Content Placeholder 2">
+            <a:extLst>
+              <a:ext uri="{FF2B5EF4-FFF2-40B4-BE49-F238E27FC236}">
+                <a16:creationId xmlns:a16="http://schemas.microsoft.com/office/drawing/2014/main" id="{50C18075-B155-4A0E-99B8-99D2DC60536D}"/>
+              </a:ext>
+            </a:extLst>
+          </p:cNvPr>
+          <p:cNvSpPr>
+            <a:spLocks noGrp="1"/>
+          </p:cNvSpPr>
+          <p:nvPr>
+            <p:ph idx="1"/>
+          </p:nvPr>
+        </p:nvSpPr>
+        <p:spPr>
+          <a:xfrm>
+            <a:off x="909320" y="5706012"/>
+            <a:ext cx="8163560" cy="795655"/>
+          </a:xfrm>
+        </p:spPr>
+        <p:txBody>
+          <a:bodyPr>
+            <a:normAutofit/>
+          </a:bodyPr>
+          <a:lstStyle/>
+          <a:p>
+            <a:pPr marL="0" indent="0">
+              <a:buNone/>
+            </a:pPr>
+            <a:r>
+              <a:rPr lang="en-US" sz="1800">
+                <a:solidFill>
+                  <a:schemeClr val="bg1"/>
+                </a:solidFill>
+                <a:latin typeface="Segoe UI Light" panose="020B0502040204020203" pitchFamily="34" charset="0"/>
+                <a:cs typeface="Segoe UI Light" panose="020B0502040204020203" pitchFamily="34" charset="0"/>
+              </a:rPr>
+              <a:t>vism@microsoft.com</a:t>
+            </a:r>
+            <a:endParaRPr lang="en-US" sz="1800" u="sng" dirty="0">
+              <a:solidFill>
+                <a:schemeClr val="bg1"/>
+              </a:solidFill>
+              <a:latin typeface="+mj-lt"/>
+            </a:endParaRPr>
+          </a:p>
+        </p:txBody>
+      </p:sp>
+    </p:spTree>
+    <p:extLst>
+      <p:ext uri="{BB962C8B-B14F-4D97-AF65-F5344CB8AC3E}">
+        <p14:creationId xmlns:p14="http://schemas.microsoft.com/office/powerpoint/2010/main" val="4141396408"/>
       </p:ext>
     </p:extLst>
   </p:cSld>

</xml_diff>